<commit_message>
Slide update to include QR code
</commit_message>
<xml_diff>
--- a/docs/JMH_Slides.pptx
+++ b/docs/JMH_Slides.pptx
@@ -5,7 +5,7 @@
     <p:sldMasterId id="2147483660" r:id="rId1"/>
   </p:sldMasterIdLst>
   <p:notesMasterIdLst>
-    <p:notesMasterId r:id="rId29"/>
+    <p:notesMasterId r:id="rId30"/>
   </p:notesMasterIdLst>
   <p:sldIdLst>
     <p:sldId id="256" r:id="rId2"/>
@@ -33,8 +33,9 @@
     <p:sldId id="306" r:id="rId24"/>
     <p:sldId id="309" r:id="rId25"/>
     <p:sldId id="316" r:id="rId26"/>
-    <p:sldId id="259" r:id="rId27"/>
-    <p:sldId id="310" r:id="rId28"/>
+    <p:sldId id="317" r:id="rId27"/>
+    <p:sldId id="259" r:id="rId28"/>
+    <p:sldId id="310" r:id="rId29"/>
   </p:sldIdLst>
   <p:sldSz cx="12192000" cy="6858000"/>
   <p:notesSz cx="6858000" cy="9144000"/>
@@ -19159,6 +19160,586 @@
 <file path=ppt/slides/slide26.xml><?xml version="1.0" encoding="utf-8"?>
 <p:sld xmlns:a="http://schemas.openxmlformats.org/drawingml/2006/main" xmlns:r="http://schemas.openxmlformats.org/officeDocument/2006/relationships" xmlns:p="http://schemas.openxmlformats.org/presentationml/2006/main">
   <p:cSld>
+    <p:bg>
+      <p:bgPr>
+        <a:solidFill>
+          <a:schemeClr val="bg1"/>
+        </a:solidFill>
+        <a:effectLst/>
+      </p:bgPr>
+    </p:bg>
+    <p:spTree>
+      <p:nvGrpSpPr>
+        <p:cNvPr id="1" name=""/>
+        <p:cNvGrpSpPr/>
+        <p:nvPr/>
+      </p:nvGrpSpPr>
+      <p:grpSpPr>
+        <a:xfrm>
+          <a:off x="0" y="0"/>
+          <a:ext cx="0" cy="0"/>
+          <a:chOff x="0" y="0"/>
+          <a:chExt cx="0" cy="0"/>
+        </a:xfrm>
+      </p:grpSpPr>
+      <p:sp useBgFill="1">
+        <p:nvSpPr>
+          <p:cNvPr id="10" name="Rectangle 9">
+            <a:extLst>
+              <a:ext uri="{FF2B5EF4-FFF2-40B4-BE49-F238E27FC236}">
+                <a16:creationId xmlns:a16="http://schemas.microsoft.com/office/drawing/2014/main" id="{25AD4A59-91FA-4E30-8F32-A8AB51F768C6}"/>
+              </a:ext>
+              <a:ext uri="{C183D7F6-B498-43B3-948B-1728B52AA6E4}">
+                <adec:decorative xmlns:adec="http://schemas.microsoft.com/office/drawing/2017/decorative" val="1"/>
+              </a:ext>
+            </a:extLst>
+          </p:cNvPr>
+          <p:cNvSpPr>
+            <a:spLocks noGrp="1" noRot="1" noChangeAspect="1" noMove="1" noResize="1" noEditPoints="1" noAdjustHandles="1" noChangeArrowheads="1" noChangeShapeType="1" noTextEdit="1"/>
+          </p:cNvSpPr>
+          <p:nvPr>
+            <p:extLst>
+              <p:ext uri="{386F3935-93C4-4BCD-93E2-E3B085C9AB24}">
+                <p16:designElem xmlns:p16="http://schemas.microsoft.com/office/powerpoint/2015/main" val="1"/>
+              </p:ext>
+            </p:extLst>
+          </p:nvPr>
+        </p:nvSpPr>
+        <p:spPr>
+          <a:xfrm>
+            <a:off x="0" y="0"/>
+            <a:ext cx="12192000" cy="6858000"/>
+          </a:xfrm>
+          <a:prstGeom prst="rect">
+            <a:avLst/>
+          </a:prstGeom>
+          <a:ln w="3848" cap="flat">
+            <a:noFill/>
+            <a:prstDash val="solid"/>
+            <a:miter/>
+          </a:ln>
+          <a:effectLst/>
+        </p:spPr>
+        <p:txBody>
+          <a:bodyPr rtlCol="0" anchor="ctr"/>
+          <a:lstStyle/>
+          <a:p>
+            <a:endParaRPr lang="en-US" dirty="0">
+              <a:solidFill>
+                <a:schemeClr val="tx1"/>
+              </a:solidFill>
+            </a:endParaRPr>
+          </a:p>
+        </p:txBody>
+      </p:sp>
+      <p:sp>
+        <p:nvSpPr>
+          <p:cNvPr id="12" name="Rectangle 11">
+            <a:extLst>
+              <a:ext uri="{FF2B5EF4-FFF2-40B4-BE49-F238E27FC236}">
+                <a16:creationId xmlns:a16="http://schemas.microsoft.com/office/drawing/2014/main" id="{CBF27B2E-4DE7-47FD-8277-1C6703DB207C}"/>
+              </a:ext>
+              <a:ext uri="{C183D7F6-B498-43B3-948B-1728B52AA6E4}">
+                <adec:decorative xmlns:adec="http://schemas.microsoft.com/office/drawing/2017/decorative" val="1"/>
+              </a:ext>
+            </a:extLst>
+          </p:cNvPr>
+          <p:cNvSpPr>
+            <a:spLocks noGrp="1" noRot="1" noChangeAspect="1" noMove="1" noResize="1" noEditPoints="1" noAdjustHandles="1" noChangeArrowheads="1" noChangeShapeType="1" noTextEdit="1"/>
+          </p:cNvSpPr>
+          <p:nvPr>
+            <p:extLst>
+              <p:ext uri="{386F3935-93C4-4BCD-93E2-E3B085C9AB24}">
+                <p16:designElem xmlns:p16="http://schemas.microsoft.com/office/powerpoint/2015/main" val="1"/>
+              </p:ext>
+            </p:extLst>
+          </p:nvPr>
+        </p:nvSpPr>
+        <p:spPr>
+          <a:xfrm>
+            <a:off x="0" y="0"/>
+            <a:ext cx="12192000" cy="6858000"/>
+          </a:xfrm>
+          <a:prstGeom prst="rect">
+            <a:avLst/>
+          </a:prstGeom>
+          <a:solidFill>
+            <a:srgbClr val="FFFFFF">
+              <a:alpha val="10000"/>
+            </a:srgbClr>
+          </a:solidFill>
+          <a:ln w="3848" cap="flat">
+            <a:noFill/>
+            <a:prstDash val="solid"/>
+            <a:miter/>
+          </a:ln>
+          <a:effectLst/>
+        </p:spPr>
+        <p:txBody>
+          <a:bodyPr rtlCol="0" anchor="ctr"/>
+          <a:lstStyle/>
+          <a:p>
+            <a:endParaRPr lang="en-US" dirty="0">
+              <a:solidFill>
+                <a:schemeClr val="tx1"/>
+              </a:solidFill>
+            </a:endParaRPr>
+          </a:p>
+        </p:txBody>
+      </p:sp>
+      <p:grpSp>
+        <p:nvGrpSpPr>
+          <p:cNvPr id="14" name="Group 13">
+            <a:extLst>
+              <a:ext uri="{FF2B5EF4-FFF2-40B4-BE49-F238E27FC236}">
+                <a16:creationId xmlns:a16="http://schemas.microsoft.com/office/drawing/2014/main" id="{30E84C15-9243-4CCA-86B8-7A13EE2808AE}"/>
+              </a:ext>
+              <a:ext uri="{C183D7F6-B498-43B3-948B-1728B52AA6E4}">
+                <adec:decorative xmlns:adec="http://schemas.microsoft.com/office/drawing/2017/decorative" val="1"/>
+              </a:ext>
+            </a:extLst>
+          </p:cNvPr>
+          <p:cNvGrpSpPr>
+            <a:grpSpLocks noGrp="1" noUngrp="1" noRot="1" noChangeAspect="1" noMove="1" noResize="1"/>
+          </p:cNvGrpSpPr>
+          <p:nvPr>
+            <p:extLst>
+              <p:ext uri="{386F3935-93C4-4BCD-93E2-E3B085C9AB24}">
+                <p16:designElem xmlns:p16="http://schemas.microsoft.com/office/powerpoint/2015/main" val="1"/>
+              </p:ext>
+            </p:extLst>
+          </p:nvPr>
+        </p:nvGrpSpPr>
+        <p:grpSpPr>
+          <a:xfrm>
+            <a:off x="195308" y="128465"/>
+            <a:ext cx="1888871" cy="1471725"/>
+            <a:chOff x="195308" y="128465"/>
+            <a:chExt cx="1888871" cy="1471725"/>
+          </a:xfrm>
+        </p:grpSpPr>
+        <p:sp useBgFill="1">
+          <p:nvSpPr>
+            <p:cNvPr id="15" name="Graphic 10">
+              <a:extLst>
+                <a:ext uri="{FF2B5EF4-FFF2-40B4-BE49-F238E27FC236}">
+                  <a16:creationId xmlns:a16="http://schemas.microsoft.com/office/drawing/2014/main" id="{E014A4E0-2539-4DA0-A0B5-71589847425C}"/>
+                </a:ext>
+                <a:ext uri="{C183D7F6-B498-43B3-948B-1728B52AA6E4}">
+                  <adec:decorative xmlns:adec="http://schemas.microsoft.com/office/drawing/2017/decorative" val="1"/>
+                </a:ext>
+              </a:extLst>
+            </p:cNvPr>
+            <p:cNvSpPr/>
+            <p:nvPr>
+              <p:extLst>
+                <p:ext uri="{386F3935-93C4-4BCD-93E2-E3B085C9AB24}">
+                  <p16:designElem xmlns:p16="http://schemas.microsoft.com/office/powerpoint/2015/main" val="1"/>
+                </p:ext>
+              </p:extLst>
+            </p:nvPr>
+          </p:nvSpPr>
+          <p:spPr>
+            <a:xfrm rot="2700000">
+              <a:off x="354841" y="128465"/>
+              <a:ext cx="966722" cy="966722"/>
+            </a:xfrm>
+            <a:custGeom>
+              <a:avLst/>
+              <a:gdLst>
+                <a:gd name="connsiteX0" fmla="*/ 4053340 w 6859500"/>
+                <a:gd name="connsiteY0" fmla="*/ 6235893 h 6859500"/>
+                <a:gd name="connsiteX1" fmla="*/ 4053340 w 6859500"/>
+                <a:gd name="connsiteY1" fmla="*/ 4053340 h 6859500"/>
+                <a:gd name="connsiteX2" fmla="*/ 6235893 w 6859500"/>
+                <a:gd name="connsiteY2" fmla="*/ 4053340 h 6859500"/>
+                <a:gd name="connsiteX3" fmla="*/ 6859501 w 6859500"/>
+                <a:gd name="connsiteY3" fmla="*/ 3429731 h 6859500"/>
+                <a:gd name="connsiteX4" fmla="*/ 6235893 w 6859500"/>
+                <a:gd name="connsiteY4" fmla="*/ 2806123 h 6859500"/>
+                <a:gd name="connsiteX5" fmla="*/ 4053340 w 6859500"/>
+                <a:gd name="connsiteY5" fmla="*/ 2806123 h 6859500"/>
+                <a:gd name="connsiteX6" fmla="*/ 4053340 w 6859500"/>
+                <a:gd name="connsiteY6" fmla="*/ 623608 h 6859500"/>
+                <a:gd name="connsiteX7" fmla="*/ 3429731 w 6859500"/>
+                <a:gd name="connsiteY7" fmla="*/ 0 h 6859500"/>
+                <a:gd name="connsiteX8" fmla="*/ 2806123 w 6859500"/>
+                <a:gd name="connsiteY8" fmla="*/ 623608 h 6859500"/>
+                <a:gd name="connsiteX9" fmla="*/ 2806123 w 6859500"/>
+                <a:gd name="connsiteY9" fmla="*/ 2806161 h 6859500"/>
+                <a:gd name="connsiteX10" fmla="*/ 623608 w 6859500"/>
+                <a:gd name="connsiteY10" fmla="*/ 2806161 h 6859500"/>
+                <a:gd name="connsiteX11" fmla="*/ 0 w 6859500"/>
+                <a:gd name="connsiteY11" fmla="*/ 3429731 h 6859500"/>
+                <a:gd name="connsiteX12" fmla="*/ 623608 w 6859500"/>
+                <a:gd name="connsiteY12" fmla="*/ 4053340 h 6859500"/>
+                <a:gd name="connsiteX13" fmla="*/ 2806161 w 6859500"/>
+                <a:gd name="connsiteY13" fmla="*/ 4053340 h 6859500"/>
+                <a:gd name="connsiteX14" fmla="*/ 2806161 w 6859500"/>
+                <a:gd name="connsiteY14" fmla="*/ 6235893 h 6859500"/>
+                <a:gd name="connsiteX15" fmla="*/ 3429770 w 6859500"/>
+                <a:gd name="connsiteY15" fmla="*/ 6859501 h 6859500"/>
+                <a:gd name="connsiteX16" fmla="*/ 4053340 w 6859500"/>
+                <a:gd name="connsiteY16" fmla="*/ 6235893 h 6859500"/>
+              </a:gdLst>
+              <a:ahLst/>
+              <a:cxnLst>
+                <a:cxn ang="0">
+                  <a:pos x="connsiteX0" y="connsiteY0"/>
+                </a:cxn>
+                <a:cxn ang="0">
+                  <a:pos x="connsiteX1" y="connsiteY1"/>
+                </a:cxn>
+                <a:cxn ang="0">
+                  <a:pos x="connsiteX2" y="connsiteY2"/>
+                </a:cxn>
+                <a:cxn ang="0">
+                  <a:pos x="connsiteX3" y="connsiteY3"/>
+                </a:cxn>
+                <a:cxn ang="0">
+                  <a:pos x="connsiteX4" y="connsiteY4"/>
+                </a:cxn>
+                <a:cxn ang="0">
+                  <a:pos x="connsiteX5" y="connsiteY5"/>
+                </a:cxn>
+                <a:cxn ang="0">
+                  <a:pos x="connsiteX6" y="connsiteY6"/>
+                </a:cxn>
+                <a:cxn ang="0">
+                  <a:pos x="connsiteX7" y="connsiteY7"/>
+                </a:cxn>
+                <a:cxn ang="0">
+                  <a:pos x="connsiteX8" y="connsiteY8"/>
+                </a:cxn>
+                <a:cxn ang="0">
+                  <a:pos x="connsiteX9" y="connsiteY9"/>
+                </a:cxn>
+                <a:cxn ang="0">
+                  <a:pos x="connsiteX10" y="connsiteY10"/>
+                </a:cxn>
+                <a:cxn ang="0">
+                  <a:pos x="connsiteX11" y="connsiteY11"/>
+                </a:cxn>
+                <a:cxn ang="0">
+                  <a:pos x="connsiteX12" y="connsiteY12"/>
+                </a:cxn>
+                <a:cxn ang="0">
+                  <a:pos x="connsiteX13" y="connsiteY13"/>
+                </a:cxn>
+                <a:cxn ang="0">
+                  <a:pos x="connsiteX14" y="connsiteY14"/>
+                </a:cxn>
+                <a:cxn ang="0">
+                  <a:pos x="connsiteX15" y="connsiteY15"/>
+                </a:cxn>
+                <a:cxn ang="0">
+                  <a:pos x="connsiteX16" y="connsiteY16"/>
+                </a:cxn>
+              </a:cxnLst>
+              <a:rect l="l" t="t" r="r" b="b"/>
+              <a:pathLst>
+                <a:path w="6859500" h="6859500">
+                  <a:moveTo>
+                    <a:pt x="4053340" y="6235893"/>
+                  </a:moveTo>
+                  <a:lnTo>
+                    <a:pt x="4053340" y="4053340"/>
+                  </a:lnTo>
+                  <a:lnTo>
+                    <a:pt x="6235893" y="4053340"/>
+                  </a:lnTo>
+                  <a:cubicBezTo>
+                    <a:pt x="6580293" y="4053340"/>
+                    <a:pt x="6859501" y="3774132"/>
+                    <a:pt x="6859501" y="3429731"/>
+                  </a:cubicBezTo>
+                  <a:cubicBezTo>
+                    <a:pt x="6859501" y="3085330"/>
+                    <a:pt x="6580332" y="2806123"/>
+                    <a:pt x="6235893" y="2806123"/>
+                  </a:cubicBezTo>
+                  <a:lnTo>
+                    <a:pt x="4053340" y="2806123"/>
+                  </a:lnTo>
+                  <a:lnTo>
+                    <a:pt x="4053340" y="623608"/>
+                  </a:lnTo>
+                  <a:cubicBezTo>
+                    <a:pt x="4053340" y="279208"/>
+                    <a:pt x="3774171" y="0"/>
+                    <a:pt x="3429731" y="0"/>
+                  </a:cubicBezTo>
+                  <a:cubicBezTo>
+                    <a:pt x="3085330" y="0"/>
+                    <a:pt x="2806123" y="279208"/>
+                    <a:pt x="2806123" y="623608"/>
+                  </a:cubicBezTo>
+                  <a:lnTo>
+                    <a:pt x="2806123" y="2806161"/>
+                  </a:lnTo>
+                  <a:lnTo>
+                    <a:pt x="623608" y="2806161"/>
+                  </a:lnTo>
+                  <a:cubicBezTo>
+                    <a:pt x="279208" y="2806161"/>
+                    <a:pt x="0" y="3085369"/>
+                    <a:pt x="0" y="3429731"/>
+                  </a:cubicBezTo>
+                  <a:cubicBezTo>
+                    <a:pt x="0" y="3774132"/>
+                    <a:pt x="279208" y="4053340"/>
+                    <a:pt x="623608" y="4053340"/>
+                  </a:cubicBezTo>
+                  <a:lnTo>
+                    <a:pt x="2806161" y="4053340"/>
+                  </a:lnTo>
+                  <a:lnTo>
+                    <a:pt x="2806161" y="6235893"/>
+                  </a:lnTo>
+                  <a:cubicBezTo>
+                    <a:pt x="2806161" y="6580293"/>
+                    <a:pt x="3085369" y="6859501"/>
+                    <a:pt x="3429770" y="6859501"/>
+                  </a:cubicBezTo>
+                  <a:cubicBezTo>
+                    <a:pt x="3774171" y="6859501"/>
+                    <a:pt x="4053340" y="6580293"/>
+                    <a:pt x="4053340" y="6235893"/>
+                  </a:cubicBezTo>
+                  <a:close/>
+                </a:path>
+              </a:pathLst>
+            </a:custGeom>
+            <a:ln w="3848" cap="flat">
+              <a:noFill/>
+              <a:prstDash val="solid"/>
+              <a:miter/>
+            </a:ln>
+            <a:effectLst>
+              <a:glow rad="152400">
+                <a:srgbClr val="000000">
+                  <a:alpha val="4000"/>
+                </a:srgbClr>
+              </a:glow>
+              <a:outerShdw blurRad="101600" dist="38100" dir="16200000" rotWithShape="0">
+                <a:srgbClr val="000000">
+                  <a:alpha val="5000"/>
+                </a:srgbClr>
+              </a:outerShdw>
+            </a:effectLst>
+          </p:spPr>
+          <p:txBody>
+            <a:bodyPr rtlCol="0" anchor="ctr"/>
+            <a:lstStyle/>
+            <a:p>
+              <a:endParaRPr lang="en-US"/>
+            </a:p>
+          </p:txBody>
+        </p:sp>
+        <p:sp useBgFill="1">
+          <p:nvSpPr>
+            <p:cNvPr id="16" name="Oval 15">
+              <a:extLst>
+                <a:ext uri="{FF2B5EF4-FFF2-40B4-BE49-F238E27FC236}">
+                  <a16:creationId xmlns:a16="http://schemas.microsoft.com/office/drawing/2014/main" id="{6A55503D-2920-4B77-A454-8FEA3378BAC1}"/>
+                </a:ext>
+                <a:ext uri="{C183D7F6-B498-43B3-948B-1728B52AA6E4}">
+                  <adec:decorative xmlns:adec="http://schemas.microsoft.com/office/drawing/2017/decorative" val="1"/>
+                </a:ext>
+              </a:extLst>
+            </p:cNvPr>
+            <p:cNvSpPr/>
+            <p:nvPr>
+              <p:extLst>
+                <p:ext uri="{386F3935-93C4-4BCD-93E2-E3B085C9AB24}">
+                  <p16:designElem xmlns:p16="http://schemas.microsoft.com/office/powerpoint/2015/main" val="1"/>
+                </p:ext>
+              </p:extLst>
+            </p:nvPr>
+          </p:nvSpPr>
+          <p:spPr>
+            <a:xfrm rot="10800000">
+              <a:off x="195308" y="1338299"/>
+              <a:ext cx="261891" cy="261891"/>
+            </a:xfrm>
+            <a:prstGeom prst="ellipse">
+              <a:avLst/>
+            </a:prstGeom>
+            <a:ln w="3848" cap="flat">
+              <a:noFill/>
+              <a:prstDash val="solid"/>
+              <a:miter/>
+            </a:ln>
+            <a:effectLst>
+              <a:glow rad="152400">
+                <a:srgbClr val="000000">
+                  <a:alpha val="4000"/>
+                </a:srgbClr>
+              </a:glow>
+              <a:outerShdw blurRad="101600" dist="38100" dir="16200000" rotWithShape="0">
+                <a:srgbClr val="000000">
+                  <a:alpha val="5000"/>
+                </a:srgbClr>
+              </a:outerShdw>
+            </a:effectLst>
+          </p:spPr>
+          <p:txBody>
+            <a:bodyPr rtlCol="0" anchor="ctr"/>
+            <a:lstStyle/>
+            <a:p>
+              <a:endParaRPr lang="en-US" dirty="0"/>
+            </a:p>
+          </p:txBody>
+        </p:sp>
+        <p:sp useBgFill="1">
+          <p:nvSpPr>
+            <p:cNvPr id="17" name="Oval 16">
+              <a:extLst>
+                <a:ext uri="{FF2B5EF4-FFF2-40B4-BE49-F238E27FC236}">
+                  <a16:creationId xmlns:a16="http://schemas.microsoft.com/office/drawing/2014/main" id="{E5300822-6CE9-4457-8099-6BF7922A99C6}"/>
+                </a:ext>
+                <a:ext uri="{C183D7F6-B498-43B3-948B-1728B52AA6E4}">
+                  <adec:decorative xmlns:adec="http://schemas.microsoft.com/office/drawing/2017/decorative" val="1"/>
+                </a:ext>
+              </a:extLst>
+            </p:cNvPr>
+            <p:cNvSpPr/>
+            <p:nvPr>
+              <p:extLst>
+                <p:ext uri="{386F3935-93C4-4BCD-93E2-E3B085C9AB24}">
+                  <p16:designElem xmlns:p16="http://schemas.microsoft.com/office/powerpoint/2015/main" val="1"/>
+                </p:ext>
+              </p:extLst>
+            </p:nvPr>
+          </p:nvSpPr>
+          <p:spPr>
+            <a:xfrm rot="10800000">
+              <a:off x="1695456" y="625555"/>
+              <a:ext cx="388723" cy="388723"/>
+            </a:xfrm>
+            <a:prstGeom prst="ellipse">
+              <a:avLst/>
+            </a:prstGeom>
+            <a:ln w="3848" cap="flat">
+              <a:noFill/>
+              <a:prstDash val="solid"/>
+              <a:miter/>
+            </a:ln>
+            <a:effectLst>
+              <a:glow rad="152400">
+                <a:srgbClr val="000000">
+                  <a:alpha val="4000"/>
+                </a:srgbClr>
+              </a:glow>
+              <a:outerShdw blurRad="101600" dist="38100" dir="16200000" rotWithShape="0">
+                <a:srgbClr val="000000">
+                  <a:alpha val="5000"/>
+                </a:srgbClr>
+              </a:outerShdw>
+            </a:effectLst>
+          </p:spPr>
+          <p:txBody>
+            <a:bodyPr rtlCol="0" anchor="ctr"/>
+            <a:lstStyle/>
+            <a:p>
+              <a:endParaRPr lang="en-US"/>
+            </a:p>
+          </p:txBody>
+        </p:sp>
+      </p:grpSp>
+      <p:sp>
+        <p:nvSpPr>
+          <p:cNvPr id="3" name="Content Placeholder 2">
+            <a:extLst>
+              <a:ext uri="{FF2B5EF4-FFF2-40B4-BE49-F238E27FC236}">
+                <a16:creationId xmlns:a16="http://schemas.microsoft.com/office/drawing/2014/main" id="{7A19A715-9402-FABB-5E64-A1608DAA7E41}"/>
+              </a:ext>
+            </a:extLst>
+          </p:cNvPr>
+          <p:cNvSpPr>
+            <a:spLocks noGrp="1"/>
+          </p:cNvSpPr>
+          <p:nvPr>
+            <p:ph idx="1"/>
+          </p:nvPr>
+        </p:nvSpPr>
+        <p:spPr>
+          <a:xfrm>
+            <a:off x="457200" y="551628"/>
+            <a:ext cx="4419594" cy="5749177"/>
+          </a:xfrm>
+        </p:spPr>
+        <p:txBody>
+          <a:bodyPr anchor="t">
+            <a:noAutofit/>
+          </a:bodyPr>
+          <a:lstStyle/>
+          <a:p>
+            <a:r>
+              <a:rPr lang="en-CA" sz="3600" dirty="0"/>
+              <a:t>The QR Code will take you to the Collections Performance V6 GitHub repo</a:t>
+            </a:r>
+          </a:p>
+          <a:p>
+            <a:r>
+              <a:rPr lang="en-CA" sz="3600" dirty="0"/>
+              <a:t>Slides are in this repo.</a:t>
+            </a:r>
+          </a:p>
+        </p:txBody>
+      </p:sp>
+      <p:pic>
+        <p:nvPicPr>
+          <p:cNvPr id="5" name="Picture 4" descr="A qr code with a white background&#10;&#10;Description automatically generated">
+            <a:extLst>
+              <a:ext uri="{FF2B5EF4-FFF2-40B4-BE49-F238E27FC236}">
+                <a16:creationId xmlns:a16="http://schemas.microsoft.com/office/drawing/2014/main" id="{D5925D04-0C03-5624-FEF9-0C00756E21A2}"/>
+              </a:ext>
+            </a:extLst>
+          </p:cNvPr>
+          <p:cNvPicPr>
+            <a:picLocks noChangeAspect="1"/>
+          </p:cNvPicPr>
+          <p:nvPr/>
+        </p:nvPicPr>
+        <p:blipFill>
+          <a:blip r:embed="rId2">
+            <a:extLst>
+              <a:ext uri="{28A0092B-C50C-407E-A947-70E740481C1C}">
+                <a14:useLocalDpi xmlns:a14="http://schemas.microsoft.com/office/drawing/2010/main" val="0"/>
+              </a:ext>
+            </a:extLst>
+          </a:blip>
+          <a:stretch>
+            <a:fillRect/>
+          </a:stretch>
+        </p:blipFill>
+        <p:spPr>
+          <a:xfrm>
+            <a:off x="5609110" y="575423"/>
+            <a:ext cx="5749177" cy="5749177"/>
+          </a:xfrm>
+          <a:prstGeom prst="rect">
+            <a:avLst/>
+          </a:prstGeom>
+        </p:spPr>
+      </p:pic>
+    </p:spTree>
+    <p:extLst>
+      <p:ext uri="{BB962C8B-B14F-4D97-AF65-F5344CB8AC3E}">
+        <p14:creationId xmlns:p14="http://schemas.microsoft.com/office/powerpoint/2010/main" val="3595957120"/>
+      </p:ext>
+    </p:extLst>
+  </p:cSld>
+  <p:clrMapOvr>
+    <a:masterClrMapping/>
+  </p:clrMapOvr>
+</p:sld>
+</file>
+
+<file path=ppt/slides/slide27.xml><?xml version="1.0" encoding="utf-8"?>
+<p:sld xmlns:a="http://schemas.openxmlformats.org/drawingml/2006/main" xmlns:r="http://schemas.openxmlformats.org/officeDocument/2006/relationships" xmlns:p="http://schemas.openxmlformats.org/presentationml/2006/main">
+  <p:cSld>
     <p:spTree>
       <p:nvGrpSpPr>
         <p:cNvPr id="1" name=""/>
@@ -19189,7 +19770,12 @@
             <p:ph type="title"/>
           </p:nvPr>
         </p:nvSpPr>
-        <p:spPr/>
+        <p:spPr>
+          <a:xfrm>
+            <a:off x="838200" y="365125"/>
+            <a:ext cx="10515600" cy="1325563"/>
+          </a:xfrm>
+        </p:spPr>
         <p:txBody>
           <a:bodyPr/>
           <a:lstStyle/>
@@ -19220,109 +19806,216 @@
         </p:nvSpPr>
         <p:spPr>
           <a:xfrm>
-            <a:off x="838200" y="1825624"/>
-            <a:ext cx="10515600" cy="4937125"/>
+            <a:off x="301083" y="1624906"/>
+            <a:ext cx="11890917" cy="4937125"/>
           </a:xfrm>
         </p:spPr>
         <p:txBody>
           <a:bodyPr>
-            <a:normAutofit fontScale="85000" lnSpcReduction="10000"/>
+            <a:noAutofit/>
           </a:bodyPr>
           <a:lstStyle/>
           <a:p>
+            <a:pPr>
+              <a:lnSpc>
+                <a:spcPct val="100000"/>
+              </a:lnSpc>
+              <a:spcBef>
+                <a:spcPts val="0"/>
+              </a:spcBef>
+              <a:spcAft>
+                <a:spcPts val="1000"/>
+              </a:spcAft>
+            </a:pPr>
             <a:r>
-              <a:rPr lang="en-CA" dirty="0">
+              <a:rPr lang="en-CA" sz="2600" dirty="0">
                 <a:hlinkClick r:id="rId2"/>
               </a:rPr>
               <a:t>https://www.geeksforgeeks.org/analysis-algorithms-big-o-analysis/</a:t>
             </a:r>
           </a:p>
           <a:p>
+            <a:pPr>
+              <a:lnSpc>
+                <a:spcPct val="100000"/>
+              </a:lnSpc>
+              <a:spcBef>
+                <a:spcPts val="0"/>
+              </a:spcBef>
+              <a:spcAft>
+                <a:spcPts val="1000"/>
+              </a:spcAft>
+            </a:pPr>
             <a:r>
-              <a:rPr lang="en-CA" dirty="0">
+              <a:rPr lang="en-CA" sz="2600" dirty="0">
                 <a:hlinkClick r:id="rId2"/>
               </a:rPr>
               <a:t>https://www.baeldung.com/java-microbenchmark-harness</a:t>
             </a:r>
-            <a:endParaRPr lang="en-CA" dirty="0"/>
+            <a:endParaRPr lang="en-CA" sz="2600" dirty="0"/>
           </a:p>
           <a:p>
+            <a:pPr>
+              <a:lnSpc>
+                <a:spcPct val="100000"/>
+              </a:lnSpc>
+              <a:spcBef>
+                <a:spcPts val="0"/>
+              </a:spcBef>
+              <a:spcAft>
+                <a:spcPts val="1000"/>
+              </a:spcAft>
+            </a:pPr>
             <a:r>
-              <a:rPr lang="en-CA" dirty="0">
+              <a:rPr lang="en-CA" sz="2600" dirty="0">
                 <a:hlinkClick r:id="rId3"/>
               </a:rPr>
               <a:t>https://javadevcentral.com/measuring-execution-time-the-wrong-way</a:t>
             </a:r>
-            <a:endParaRPr lang="en-CA" dirty="0"/>
+            <a:endParaRPr lang="en-CA" sz="2600" dirty="0"/>
           </a:p>
           <a:p>
+            <a:pPr>
+              <a:lnSpc>
+                <a:spcPct val="100000"/>
+              </a:lnSpc>
+              <a:spcBef>
+                <a:spcPts val="0"/>
+              </a:spcBef>
+              <a:spcAft>
+                <a:spcPts val="1000"/>
+              </a:spcAft>
+            </a:pPr>
             <a:r>
-              <a:rPr lang="en-CA" dirty="0">
+              <a:rPr lang="en-CA" sz="2600" dirty="0">
                 <a:hlinkClick r:id="rId4"/>
               </a:rPr>
               <a:t>https://javadevcentral.com/naive-benchmarking-framework-in-java</a:t>
             </a:r>
-            <a:endParaRPr lang="en-CA" dirty="0"/>
+            <a:endParaRPr lang="en-CA" sz="2600" dirty="0"/>
           </a:p>
           <a:p>
+            <a:pPr>
+              <a:lnSpc>
+                <a:spcPct val="100000"/>
+              </a:lnSpc>
+              <a:spcBef>
+                <a:spcPts val="0"/>
+              </a:spcBef>
+              <a:spcAft>
+                <a:spcPts val="1000"/>
+              </a:spcAft>
+            </a:pPr>
             <a:r>
-              <a:rPr lang="en-CA" dirty="0">
+              <a:rPr lang="en-CA" sz="2600" dirty="0">
                 <a:hlinkClick r:id="rId5"/>
               </a:rPr>
               <a:t>https://javadevcentral.com/jmh-benchmark-with-examples</a:t>
             </a:r>
-            <a:endParaRPr lang="en-CA" dirty="0"/>
+            <a:endParaRPr lang="en-CA" sz="2600" dirty="0"/>
           </a:p>
           <a:p>
+            <a:pPr>
+              <a:lnSpc>
+                <a:spcPct val="100000"/>
+              </a:lnSpc>
+              <a:spcBef>
+                <a:spcPts val="0"/>
+              </a:spcBef>
+              <a:spcAft>
+                <a:spcPts val="1000"/>
+              </a:spcAft>
+            </a:pPr>
             <a:r>
-              <a:rPr lang="en-CA" dirty="0">
+              <a:rPr lang="en-CA" sz="2600" dirty="0">
                 <a:hlinkClick r:id="rId6"/>
               </a:rPr>
               <a:t>https://blog.nyrkio.com/2024/06/27/an-introduction-to-benchmarks/</a:t>
             </a:r>
-            <a:endParaRPr lang="en-CA" dirty="0"/>
+            <a:endParaRPr lang="en-CA" sz="2600" dirty="0"/>
           </a:p>
           <a:p>
+            <a:pPr>
+              <a:lnSpc>
+                <a:spcPct val="100000"/>
+              </a:lnSpc>
+              <a:spcBef>
+                <a:spcPts val="0"/>
+              </a:spcBef>
+              <a:spcAft>
+                <a:spcPts val="1000"/>
+              </a:spcAft>
+            </a:pPr>
             <a:r>
-              <a:rPr lang="en-CA" dirty="0">
+              <a:rPr lang="en-CA" sz="2600" dirty="0">
                 <a:hlinkClick r:id="rId7"/>
               </a:rPr>
               <a:t>https://jenkov.com/tutorials/java-performance/jmh.html</a:t>
             </a:r>
-            <a:endParaRPr lang="en-CA" dirty="0"/>
+            <a:endParaRPr lang="en-CA" sz="2600" dirty="0"/>
           </a:p>
           <a:p>
+            <a:pPr>
+              <a:lnSpc>
+                <a:spcPct val="100000"/>
+              </a:lnSpc>
+              <a:spcBef>
+                <a:spcPts val="0"/>
+              </a:spcBef>
+              <a:spcAft>
+                <a:spcPts val="1000"/>
+              </a:spcAft>
+            </a:pPr>
             <a:r>
-              <a:rPr lang="en-CA" dirty="0">
+              <a:rPr lang="en-CA" sz="2600" dirty="0">
                 <a:hlinkClick r:id="rId8"/>
               </a:rPr>
               <a:t>https://java-performance.info/jmh/</a:t>
             </a:r>
-            <a:endParaRPr lang="en-CA" dirty="0"/>
+            <a:endParaRPr lang="en-CA" sz="2600" dirty="0"/>
           </a:p>
           <a:p>
+            <a:pPr>
+              <a:lnSpc>
+                <a:spcPct val="100000"/>
+              </a:lnSpc>
+              <a:spcBef>
+                <a:spcPts val="0"/>
+              </a:spcBef>
+              <a:spcAft>
+                <a:spcPts val="1000"/>
+              </a:spcAft>
+            </a:pPr>
             <a:r>
-              <a:rPr lang="en-CA" dirty="0">
+              <a:rPr lang="en-CA" sz="2600" dirty="0">
                 <a:hlinkClick r:id="rId9"/>
-              </a:rPr>
-              <a:t>https://javadoc.io/doc/org.openjdk.jmh/jmh-core/latest/index.html</a:t>
-            </a:r>
-            <a:endParaRPr lang="en-CA" dirty="0"/>
-          </a:p>
-          <a:p>
-            <a:r>
-              <a:rPr lang="en-CA" dirty="0">
-                <a:hlinkClick r:id="rId10"/>
               </a:rPr>
               <a:t>https://www.javaadvent.com/2019/12/measuring-time-from-java-to-kernel-and-back.html</a:t>
             </a:r>
-            <a:endParaRPr lang="en-CA" dirty="0"/>
+            <a:endParaRPr lang="en-CA" sz="2600" dirty="0"/>
           </a:p>
           <a:p>
-            <a:endParaRPr lang="en-CA" dirty="0"/>
+            <a:pPr>
+              <a:lnSpc>
+                <a:spcPct val="100000"/>
+              </a:lnSpc>
+              <a:spcBef>
+                <a:spcPts val="0"/>
+              </a:spcBef>
+            </a:pPr>
+            <a:endParaRPr lang="en-CA" sz="2600" dirty="0"/>
           </a:p>
           <a:p>
-            <a:endParaRPr lang="en-CA" dirty="0"/>
+            <a:pPr marL="0" indent="0">
+              <a:lnSpc>
+                <a:spcPct val="100000"/>
+              </a:lnSpc>
+              <a:spcBef>
+                <a:spcPts val="0"/>
+              </a:spcBef>
+              <a:buNone/>
+            </a:pPr>
+            <a:endParaRPr lang="en-CA" sz="2600" dirty="0"/>
           </a:p>
         </p:txBody>
       </p:sp>
@@ -19339,7 +20032,7 @@
 </p:sld>
 </file>
 
-<file path=ppt/slides/slide27.xml><?xml version="1.0" encoding="utf-8"?>
+<file path=ppt/slides/slide28.xml><?xml version="1.0" encoding="utf-8"?>
 <p:sld xmlns:a="http://schemas.openxmlformats.org/drawingml/2006/main" xmlns:r="http://schemas.openxmlformats.org/officeDocument/2006/relationships" xmlns:p="http://schemas.openxmlformats.org/presentationml/2006/main">
   <p:cSld>
     <p:spTree>
@@ -19401,9 +20094,16 @@
             <p:ph idx="1"/>
           </p:nvPr>
         </p:nvSpPr>
-        <p:spPr/>
+        <p:spPr>
+          <a:xfrm>
+            <a:off x="838200" y="1825625"/>
+            <a:ext cx="11353800" cy="4351338"/>
+          </a:xfrm>
+        </p:spPr>
         <p:txBody>
-          <a:bodyPr/>
+          <a:bodyPr>
+            <a:normAutofit fontScale="92500"/>
+          </a:bodyPr>
           <a:lstStyle/>
           <a:p>
             <a:r>
@@ -19456,6 +20156,26 @@
                 <a:hlinkClick r:id="rId6"/>
               </a:rPr>
               <a:t>https://github.com/openjdk/jmh</a:t>
+            </a:r>
+            <a:endParaRPr lang="en-CA" dirty="0"/>
+          </a:p>
+          <a:p>
+            <a:r>
+              <a:rPr lang="en-CA" dirty="0"/>
+              <a:t>The JMH </a:t>
+            </a:r>
+            <a:r>
+              <a:rPr lang="en-CA" dirty="0" err="1"/>
+              <a:t>JavaDocs</a:t>
+            </a:r>
+            <a:endParaRPr lang="en-CA" dirty="0"/>
+          </a:p>
+          <a:p>
+            <a:r>
+              <a:rPr lang="en-CA" dirty="0">
+                <a:hlinkClick r:id="rId7"/>
+              </a:rPr>
+              <a:t>https://javadoc.io/doc/org.openjdk.jmh/jmh-core/latest/index.html</a:t>
             </a:r>
             <a:endParaRPr lang="en-CA" dirty="0"/>
           </a:p>

</xml_diff>